<commit_message>
CodeStar for Develop and Deploy
</commit_message>
<xml_diff>
--- a/Ch01_AWS_Overview.pptx
+++ b/Ch01_AWS_Overview.pptx
@@ -3666,7 +3666,7 @@
                   <a:srgbClr val="FFFF00"/>
                 </a:solidFill>
               </a:rPr>
-              <a:t>1.1 AWS</a:t>
+              <a:t>1 AWS</a:t>
             </a:r>
             <a:endParaRPr lang="zh-TW" altLang="en-US" b="1" dirty="0">
               <a:solidFill>
@@ -3953,7 +3953,7 @@
                   <a:srgbClr val="FFFF00"/>
                 </a:solidFill>
               </a:rPr>
-              <a:t>1.1 AWS</a:t>
+              <a:t>1 AWS</a:t>
             </a:r>
             <a:endParaRPr lang="zh-TW" altLang="en-US" b="1" dirty="0">
               <a:solidFill>
@@ -4396,7 +4396,7 @@
                   <a:srgbClr val="FFFF00"/>
                 </a:solidFill>
               </a:rPr>
-              <a:t>1.1 AWS</a:t>
+              <a:t>1 AWS</a:t>
             </a:r>
             <a:endParaRPr lang="zh-TW" altLang="en-US" b="1" dirty="0">
               <a:solidFill>
@@ -4805,7 +4805,7 @@
                   <a:srgbClr val="FFFF00"/>
                 </a:solidFill>
               </a:rPr>
-              <a:t>1.1 AWS</a:t>
+              <a:t>1 AWS</a:t>
             </a:r>
             <a:endParaRPr lang="zh-TW" altLang="en-US" b="1" dirty="0">
               <a:solidFill>
@@ -5213,7 +5213,7 @@
                   <a:srgbClr val="FFFF00"/>
                 </a:solidFill>
               </a:rPr>
-              <a:t>1.1 AWS</a:t>
+              <a:t>1 AWS</a:t>
             </a:r>
             <a:endParaRPr lang="zh-TW" altLang="en-US" b="1" dirty="0">
               <a:solidFill>
@@ -5533,7 +5533,7 @@
                   <a:srgbClr val="FFFF00"/>
                 </a:solidFill>
               </a:rPr>
-              <a:t>1.1 AWS</a:t>
+              <a:t>1 AWS</a:t>
             </a:r>
             <a:endParaRPr lang="zh-TW" altLang="en-US" b="1" dirty="0">
               <a:solidFill>
@@ -6026,7 +6026,7 @@
                   <a:srgbClr val="FFFF00"/>
                 </a:solidFill>
               </a:rPr>
-              <a:t>1.1 AWS</a:t>
+              <a:t>1 AWS</a:t>
             </a:r>
             <a:endParaRPr lang="zh-TW" altLang="en-US" b="1" dirty="0">
               <a:solidFill>
@@ -6295,7 +6295,7 @@
                   <a:srgbClr val="FFFF00"/>
                 </a:solidFill>
               </a:rPr>
-              <a:t>1.1 AWS</a:t>
+              <a:t>1 AWS</a:t>
             </a:r>
             <a:endParaRPr lang="zh-TW" altLang="en-US" b="1" dirty="0">
               <a:solidFill>
@@ -6651,7 +6651,7 @@
                   <a:srgbClr val="FFFF00"/>
                 </a:solidFill>
               </a:rPr>
-              <a:t>1.1 AWS</a:t>
+              <a:t>1 AWS</a:t>
             </a:r>
             <a:endParaRPr lang="zh-TW" altLang="en-US" b="1" dirty="0">
               <a:solidFill>
@@ -7059,7 +7059,7 @@
                   <a:srgbClr val="FFFF00"/>
                 </a:solidFill>
               </a:rPr>
-              <a:t>1.1 AWS</a:t>
+              <a:t>1 AWS</a:t>
             </a:r>
             <a:endParaRPr lang="zh-TW" altLang="en-US" b="1" dirty="0">
               <a:solidFill>
@@ -7432,7 +7432,7 @@
                   <a:srgbClr val="FFFF00"/>
                 </a:solidFill>
               </a:rPr>
-              <a:t>1.1 AWS</a:t>
+              <a:t>1 AWS</a:t>
             </a:r>
             <a:endParaRPr lang="zh-TW" altLang="en-US" b="1" dirty="0">
               <a:solidFill>
@@ -7787,7 +7787,7 @@
                   <a:srgbClr val="FFFF00"/>
                 </a:solidFill>
               </a:rPr>
-              <a:t>1.1 AWS</a:t>
+              <a:t>1 AWS</a:t>
             </a:r>
             <a:endParaRPr lang="zh-TW" altLang="en-US" b="1" dirty="0">
               <a:solidFill>
@@ -8143,7 +8143,7 @@
                   <a:srgbClr val="FFFF00"/>
                 </a:solidFill>
               </a:rPr>
-              <a:t>1.1 AWS</a:t>
+              <a:t>1 AWS</a:t>
             </a:r>
             <a:endParaRPr lang="zh-TW" altLang="en-US" b="1" dirty="0">
               <a:solidFill>
@@ -8752,7 +8752,7 @@
                   <a:srgbClr val="FFFF00"/>
                 </a:solidFill>
               </a:rPr>
-              <a:t>1.1 AWS</a:t>
+              <a:t>1 AWS</a:t>
             </a:r>
             <a:endParaRPr lang="zh-TW" altLang="en-US" b="1" dirty="0">
               <a:solidFill>

</xml_diff>